<commit_message>
添加 dcgan keras pytorch 代码
添加 dcgan keras pytorch 代码
</commit_message>
<xml_diff>
--- a/GAN_Understanding/GANunderstanding.pptx
+++ b/GAN_Understanding/GANunderstanding.pptx
@@ -2825,7 +2825,7 @@
         <a:spcBef>
           <a:spcPts val="1000"/>
         </a:spcBef>
-        <a:buFont typeface="Arial" panose="020B0604020202020204" pitchFamily="34" charset="0"/>
+        <a:buFont typeface="Arial" panose="020B0604020202090204" pitchFamily="34" charset="0"/>
         <a:buChar char="•"/>
         <a:defRPr sz="2800" kern="1200">
           <a:solidFill>
@@ -2843,7 +2843,7 @@
         <a:spcBef>
           <a:spcPts val="500"/>
         </a:spcBef>
-        <a:buFont typeface="Arial" panose="020B0604020202020204" pitchFamily="34" charset="0"/>
+        <a:buFont typeface="Arial" panose="020B0604020202090204" pitchFamily="34" charset="0"/>
         <a:buChar char="•"/>
         <a:defRPr sz="2400" kern="1200">
           <a:solidFill>
@@ -2861,7 +2861,7 @@
         <a:spcBef>
           <a:spcPts val="500"/>
         </a:spcBef>
-        <a:buFont typeface="Arial" panose="020B0604020202020204" pitchFamily="34" charset="0"/>
+        <a:buFont typeface="Arial" panose="020B0604020202090204" pitchFamily="34" charset="0"/>
         <a:buChar char="•"/>
         <a:defRPr sz="2000" kern="1200">
           <a:solidFill>
@@ -2879,7 +2879,7 @@
         <a:spcBef>
           <a:spcPts val="500"/>
         </a:spcBef>
-        <a:buFont typeface="Arial" panose="020B0604020202020204" pitchFamily="34" charset="0"/>
+        <a:buFont typeface="Arial" panose="020B0604020202090204" pitchFamily="34" charset="0"/>
         <a:buChar char="•"/>
         <a:defRPr sz="1800" kern="1200">
           <a:solidFill>
@@ -2897,7 +2897,7 @@
         <a:spcBef>
           <a:spcPts val="500"/>
         </a:spcBef>
-        <a:buFont typeface="Arial" panose="020B0604020202020204" pitchFamily="34" charset="0"/>
+        <a:buFont typeface="Arial" panose="020B0604020202090204" pitchFamily="34" charset="0"/>
         <a:buChar char="•"/>
         <a:defRPr sz="1800" kern="1200">
           <a:solidFill>
@@ -2915,7 +2915,7 @@
         <a:spcBef>
           <a:spcPts val="500"/>
         </a:spcBef>
-        <a:buFont typeface="Arial" panose="020B0604020202020204" pitchFamily="34" charset="0"/>
+        <a:buFont typeface="Arial" panose="020B0604020202090204" pitchFamily="34" charset="0"/>
         <a:buChar char="•"/>
         <a:defRPr sz="1800" kern="1200">
           <a:solidFill>
@@ -2933,7 +2933,7 @@
         <a:spcBef>
           <a:spcPts val="500"/>
         </a:spcBef>
-        <a:buFont typeface="Arial" panose="020B0604020202020204" pitchFamily="34" charset="0"/>
+        <a:buFont typeface="Arial" panose="020B0604020202090204" pitchFamily="34" charset="0"/>
         <a:buChar char="•"/>
         <a:defRPr sz="1800" kern="1200">
           <a:solidFill>
@@ -2951,7 +2951,7 @@
         <a:spcBef>
           <a:spcPts val="500"/>
         </a:spcBef>
-        <a:buFont typeface="Arial" panose="020B0604020202020204" pitchFamily="34" charset="0"/>
+        <a:buFont typeface="Arial" panose="020B0604020202090204" pitchFamily="34" charset="0"/>
         <a:buChar char="•"/>
         <a:defRPr sz="1800" kern="1200">
           <a:solidFill>
@@ -2969,7 +2969,7 @@
         <a:spcBef>
           <a:spcPts val="500"/>
         </a:spcBef>
-        <a:buFont typeface="Arial" panose="020B0604020202020204" pitchFamily="34" charset="0"/>
+        <a:buFont typeface="Arial" panose="020B0604020202090204" pitchFamily="34" charset="0"/>
         <a:buChar char="•"/>
         <a:defRPr sz="1800" kern="1200">
           <a:solidFill>
@@ -6026,7 +6026,7 @@
             <a:p>
               <a:pPr algn="ctr"/>
               <a:endParaRPr lang="zh-CN" altLang="en-US">
-                <a:latin typeface="Arial" panose="020B0604020202020204" pitchFamily="34" charset="0"/>
+                <a:latin typeface="Arial" panose="020B0604020202090204" pitchFamily="34" charset="0"/>
               </a:endParaRPr>
             </a:p>
           </p:txBody>
@@ -6227,7 +6227,7 @@
             <a:p>
               <a:pPr algn="ctr"/>
               <a:endParaRPr lang="zh-CN" altLang="en-US">
-                <a:latin typeface="Arial" panose="020B0604020202020204" pitchFamily="34" charset="0"/>
+                <a:latin typeface="Arial" panose="020B0604020202090204" pitchFamily="34" charset="0"/>
               </a:endParaRPr>
             </a:p>
           </p:txBody>
@@ -6518,7 +6518,7 @@
             <a:p>
               <a:pPr algn="ctr"/>
               <a:endParaRPr lang="zh-CN" altLang="en-US">
-                <a:latin typeface="Arial" panose="020B0604020202020204" pitchFamily="34" charset="0"/>
+                <a:latin typeface="Arial" panose="020B0604020202090204" pitchFamily="34" charset="0"/>
               </a:endParaRPr>
             </a:p>
           </p:txBody>
@@ -12098,7 +12098,7 @@
           </a:bodyPr>
           <a:p>
             <a:pPr marL="171450" indent="-171450">
-              <a:buFont typeface="Arial" panose="020B0604020202020204" pitchFamily="34" charset="0"/>
+              <a:buFont typeface="Arial" panose="020B0604020202090204" pitchFamily="34" charset="0"/>
               <a:buChar char="•"/>
             </a:pPr>
             <a:r>
@@ -12125,7 +12125,7 @@
           </a:p>
           <a:p>
             <a:pPr lvl="0" indent="0">
-              <a:buFont typeface="Arial" panose="020B0604020202020204" pitchFamily="34" charset="0"/>
+              <a:buFont typeface="Arial" panose="020B0604020202090204" pitchFamily="34" charset="0"/>
               <a:buNone/>
             </a:pPr>
             <a:r>
@@ -12152,7 +12152,7 @@
           </a:p>
           <a:p>
             <a:pPr lvl="0" indent="0">
-              <a:buFont typeface="Arial" panose="020B0604020202020204" pitchFamily="34" charset="0"/>
+              <a:buFont typeface="Arial" panose="020B0604020202090204" pitchFamily="34" charset="0"/>
               <a:buNone/>
             </a:pPr>
             <a:r>
@@ -12179,7 +12179,7 @@
           </a:p>
           <a:p>
             <a:pPr marL="171450" indent="-171450">
-              <a:buFont typeface="Arial" panose="020B0604020202020204" pitchFamily="34" charset="0"/>
+              <a:buFont typeface="Arial" panose="020B0604020202090204" pitchFamily="34" charset="0"/>
               <a:buChar char="•"/>
             </a:pPr>
             <a:endParaRPr lang="zh-CN" altLang="en-US" sz="1200">
@@ -12194,7 +12194,7 @@
           </a:p>
           <a:p>
             <a:pPr marL="171450" indent="-171450">
-              <a:buFont typeface="Arial" panose="020B0604020202020204" pitchFamily="34" charset="0"/>
+              <a:buFont typeface="Arial" panose="020B0604020202090204" pitchFamily="34" charset="0"/>
               <a:buChar char="•"/>
             </a:pPr>
             <a:r>
@@ -12221,7 +12221,7 @@
           </a:p>
           <a:p>
             <a:pPr indent="0">
-              <a:buFont typeface="Arial" panose="020B0604020202020204" pitchFamily="34" charset="0"/>
+              <a:buFont typeface="Arial" panose="020B0604020202090204" pitchFamily="34" charset="0"/>
               <a:buNone/>
             </a:pPr>
             <a:r>
@@ -12386,7 +12386,7 @@
             <a:p>
               <a:pPr algn="ctr"/>
               <a:endParaRPr lang="zh-CN" altLang="en-US">
-                <a:latin typeface="Arial" panose="020B0604020202020204" pitchFamily="34" charset="0"/>
+                <a:latin typeface="Arial" panose="020B0604020202090204" pitchFamily="34" charset="0"/>
               </a:endParaRPr>
             </a:p>
           </p:txBody>
@@ -12901,21 +12901,15 @@
           <p:nvPr/>
         </p:nvPicPr>
         <p:blipFill>
-          <a:blip r:embed="rId1">
-            <a:extLst>
-              <a:ext uri="{96DAC541-7B7A-43D3-8B79-37D633B846F1}">
-                <asvg:svgBlip xmlns:asvg="http://schemas.microsoft.com/office/drawing/2016/SVG/main" r:embed="rId2"/>
-              </a:ext>
-            </a:extLst>
-          </a:blip>
+          <a:blip r:embed="rId1"/>
           <a:stretch>
             <a:fillRect/>
           </a:stretch>
         </p:blipFill>
         <p:spPr>
           <a:xfrm>
-            <a:off x="1303020" y="1216660"/>
-            <a:ext cx="9144000" cy="3619500"/>
+            <a:off x="1369695" y="484505"/>
+            <a:ext cx="6736715" cy="2666365"/>
           </a:xfrm>
           <a:prstGeom prst="rect">
             <a:avLst/>
@@ -12930,7 +12924,7 @@
         </p:nvSpPr>
         <p:spPr>
           <a:xfrm>
-            <a:off x="1303020" y="1726565"/>
+            <a:off x="476885" y="793750"/>
             <a:ext cx="1522095" cy="306705"/>
           </a:xfrm>
           <a:prstGeom prst="rect">
@@ -13028,6 +13022,60 @@
               <a:latin typeface="微软雅黑" panose="020B0503020204020204" charset="-122"/>
               <a:ea typeface="微软雅黑" panose="020B0503020204020204" charset="-122"/>
             </a:endParaRPr>
+          </a:p>
+        </p:txBody>
+      </p:sp>
+      <p:sp>
+        <p:nvSpPr>
+          <p:cNvPr id="28" name="立方体 27"/>
+          <p:cNvSpPr/>
+          <p:nvPr/>
+        </p:nvSpPr>
+        <p:spPr>
+          <a:xfrm>
+            <a:off x="1774190" y="3572510"/>
+            <a:ext cx="2372360" cy="563880"/>
+          </a:xfrm>
+          <a:prstGeom prst="cube">
+            <a:avLst>
+              <a:gd name="adj" fmla="val 36373"/>
+            </a:avLst>
+          </a:prstGeom>
+          <a:solidFill>
+            <a:schemeClr val="accent4">
+              <a:lumMod val="20000"/>
+              <a:lumOff val="80000"/>
+            </a:schemeClr>
+          </a:solidFill>
+          <a:ln w="3175">
+            <a:solidFill>
+              <a:schemeClr val="bg1">
+                <a:lumMod val="65000"/>
+              </a:schemeClr>
+            </a:solidFill>
+          </a:ln>
+        </p:spPr>
+        <p:style>
+          <a:lnRef idx="2">
+            <a:schemeClr val="accent1">
+              <a:shade val="50000"/>
+            </a:schemeClr>
+          </a:lnRef>
+          <a:fillRef idx="1">
+            <a:schemeClr val="accent1"/>
+          </a:fillRef>
+          <a:effectRef idx="0">
+            <a:schemeClr val="accent1"/>
+          </a:effectRef>
+          <a:fontRef idx="minor">
+            <a:schemeClr val="lt1"/>
+          </a:fontRef>
+        </p:style>
+        <p:txBody>
+          <a:bodyPr rtlCol="0" anchor="ctr"/>
+          <a:p>
+            <a:pPr algn="ctr"/>
+            <a:endParaRPr lang="zh-CN" altLang="en-US"/>
           </a:p>
         </p:txBody>
       </p:sp>
@@ -16852,7 +16900,7 @@
                     <a:lumOff val="50000"/>
                   </a:schemeClr>
                 </a:solidFill>
-                <a:latin typeface="Arial" panose="020B0604020202020204" pitchFamily="34" charset="0"/>
+                <a:latin typeface="Arial" panose="020B0604020202090204" pitchFamily="34" charset="0"/>
               </a:rPr>
               <a:t>221x221x96</a:t>
             </a:r>
@@ -16863,7 +16911,7 @@
                   <a:lumOff val="50000"/>
                 </a:schemeClr>
               </a:solidFill>
-              <a:latin typeface="Arial" panose="020B0604020202020204" pitchFamily="34" charset="0"/>
+              <a:latin typeface="Arial" panose="020B0604020202090204" pitchFamily="34" charset="0"/>
             </a:endParaRPr>
           </a:p>
         </p:txBody>
@@ -16917,7 +16965,7 @@
                     <a:lumOff val="50000"/>
                   </a:schemeClr>
                 </a:solidFill>
-                <a:latin typeface="Arial" panose="020B0604020202020204" pitchFamily="34" charset="0"/>
+                <a:latin typeface="Arial" panose="020B0604020202090204" pitchFamily="34" charset="0"/>
               </a:rPr>
               <a:t>36x36x256</a:t>
             </a:r>
@@ -16928,7 +16976,7 @@
                   <a:lumOff val="50000"/>
                 </a:schemeClr>
               </a:solidFill>
-              <a:latin typeface="Arial" panose="020B0604020202020204" pitchFamily="34" charset="0"/>
+              <a:latin typeface="Arial" panose="020B0604020202090204" pitchFamily="34" charset="0"/>
             </a:endParaRPr>
           </a:p>
         </p:txBody>
@@ -16982,7 +17030,7 @@
                     <a:lumOff val="50000"/>
                   </a:schemeClr>
                 </a:solidFill>
-                <a:latin typeface="Arial" panose="020B0604020202020204" pitchFamily="34" charset="0"/>
+                <a:latin typeface="Arial" panose="020B0604020202090204" pitchFamily="34" charset="0"/>
               </a:rPr>
               <a:t>15x15x512</a:t>
             </a:r>
@@ -16993,7 +17041,7 @@
                   <a:lumOff val="50000"/>
                 </a:schemeClr>
               </a:solidFill>
-              <a:latin typeface="Arial" panose="020B0604020202020204" pitchFamily="34" charset="0"/>
+              <a:latin typeface="Arial" panose="020B0604020202090204" pitchFamily="34" charset="0"/>
             </a:endParaRPr>
           </a:p>
         </p:txBody>
@@ -17047,7 +17095,7 @@
                     <a:lumOff val="50000"/>
                   </a:schemeClr>
                 </a:solidFill>
-                <a:latin typeface="Arial" panose="020B0604020202020204" pitchFamily="34" charset="0"/>
+                <a:latin typeface="Arial" panose="020B0604020202090204" pitchFamily="34" charset="0"/>
               </a:rPr>
               <a:t>15x15x512</a:t>
             </a:r>
@@ -17058,7 +17106,7 @@
                   <a:lumOff val="50000"/>
                 </a:schemeClr>
               </a:solidFill>
-              <a:latin typeface="Arial" panose="020B0604020202020204" pitchFamily="34" charset="0"/>
+              <a:latin typeface="Arial" panose="020B0604020202090204" pitchFamily="34" charset="0"/>
             </a:endParaRPr>
           </a:p>
         </p:txBody>
@@ -17112,7 +17160,7 @@
                     <a:lumOff val="50000"/>
                   </a:schemeClr>
                 </a:solidFill>
-                <a:latin typeface="Arial" panose="020B0604020202020204" pitchFamily="34" charset="0"/>
+                <a:latin typeface="Arial" panose="020B0604020202090204" pitchFamily="34" charset="0"/>
               </a:rPr>
               <a:t>15x15x1024</a:t>
             </a:r>
@@ -17123,7 +17171,7 @@
                   <a:lumOff val="50000"/>
                 </a:schemeClr>
               </a:solidFill>
-              <a:latin typeface="Arial" panose="020B0604020202020204" pitchFamily="34" charset="0"/>
+              <a:latin typeface="Arial" panose="020B0604020202090204" pitchFamily="34" charset="0"/>
             </a:endParaRPr>
           </a:p>
         </p:txBody>
@@ -18210,7 +18258,7 @@
               <a:lnSpc>
                 <a:spcPct val="90000"/>
               </a:lnSpc>
-              <a:buFont typeface="Arial" panose="020B0604020202020204" pitchFamily="34" charset="0"/>
+              <a:buFont typeface="Arial" panose="020B0604020202090204" pitchFamily="34" charset="0"/>
               <a:buChar char="•"/>
             </a:pPr>
             <a:r>
@@ -18268,7 +18316,7 @@
               <a:lnSpc>
                 <a:spcPct val="90000"/>
               </a:lnSpc>
-              <a:buFont typeface="Arial" panose="020B0604020202020204" pitchFamily="34" charset="0"/>
+              <a:buFont typeface="Arial" panose="020B0604020202090204" pitchFamily="34" charset="0"/>
               <a:buNone/>
             </a:pPr>
             <a:r>
@@ -18313,7 +18361,7 @@
               <a:lnSpc>
                 <a:spcPct val="90000"/>
               </a:lnSpc>
-              <a:buFont typeface="Arial" panose="020B0604020202020204" pitchFamily="34" charset="0"/>
+              <a:buFont typeface="Arial" panose="020B0604020202090204" pitchFamily="34" charset="0"/>
               <a:buChar char="•"/>
             </a:pPr>
             <a:endParaRPr lang="zh-CN" altLang="en-US" sz="1200">
@@ -18332,7 +18380,7 @@
               <a:lnSpc>
                 <a:spcPct val="90000"/>
               </a:lnSpc>
-              <a:buFont typeface="Arial" panose="020B0604020202020204" pitchFamily="34" charset="0"/>
+              <a:buFont typeface="Arial" panose="020B0604020202090204" pitchFamily="34" charset="0"/>
               <a:buChar char="•"/>
             </a:pPr>
             <a:r>
@@ -18390,7 +18438,7 @@
               <a:lnSpc>
                 <a:spcPct val="90000"/>
               </a:lnSpc>
-              <a:buFont typeface="Arial" panose="020B0604020202020204" pitchFamily="34" charset="0"/>
+              <a:buFont typeface="Arial" panose="020B0604020202090204" pitchFamily="34" charset="0"/>
               <a:buNone/>
             </a:pPr>
             <a:r>
@@ -18435,7 +18483,7 @@
               <a:lnSpc>
                 <a:spcPct val="90000"/>
               </a:lnSpc>
-              <a:buFont typeface="Arial" panose="020B0604020202020204" pitchFamily="34" charset="0"/>
+              <a:buFont typeface="Arial" panose="020B0604020202090204" pitchFamily="34" charset="0"/>
               <a:buChar char="•"/>
             </a:pPr>
             <a:endParaRPr lang="zh-CN" altLang="en-US" sz="1200">
@@ -18454,7 +18502,7 @@
               <a:lnSpc>
                 <a:spcPct val="90000"/>
               </a:lnSpc>
-              <a:buFont typeface="Arial" panose="020B0604020202020204" pitchFamily="34" charset="0"/>
+              <a:buFont typeface="Arial" panose="020B0604020202090204" pitchFamily="34" charset="0"/>
               <a:buChar char="•"/>
             </a:pPr>
             <a:r>
@@ -18515,7 +18563,7 @@
               <a:lnSpc>
                 <a:spcPct val="90000"/>
               </a:lnSpc>
-              <a:buFont typeface="Arial" panose="020B0604020202020204" pitchFamily="34" charset="0"/>
+              <a:buFont typeface="Arial" panose="020B0604020202090204" pitchFamily="34" charset="0"/>
               <a:buNone/>
             </a:pPr>
             <a:r>

</xml_diff>